<commit_message>
added design ppt, audience analysis sheet, and design activity. 10/14
</commit_message>
<xml_diff>
--- a/readings/design.pptx
+++ b/readings/design.pptx
@@ -8854,31 +8854,46 @@
           <a:p>
             <a:pPr lvl="1"/>
             <a:r>
+              <a:rPr lang="en-US" b="1" dirty="0" smtClean="0"/>
+              <a:t>Interviewing</a:t>
+            </a:r>
+            <a:r>
               <a:rPr lang="en-US" dirty="0" smtClean="0"/>
-              <a:t>Interviewing and constructing audience profiles</a:t>
+              <a:t> and constructing audience profiles</a:t>
             </a:r>
           </a:p>
           <a:p>
             <a:pPr lvl="1"/>
             <a:r>
+              <a:rPr lang="en-US" b="1" dirty="0" smtClean="0"/>
+              <a:t>Differentiating</a:t>
+            </a:r>
+            <a:r>
               <a:rPr lang="en-US" dirty="0" smtClean="0"/>
-              <a:t>Differentiating data from information and knowledge</a:t>
+              <a:t> data from information and knowledge</a:t>
             </a:r>
           </a:p>
           <a:p>
             <a:pPr lvl="1"/>
             <a:r>
+              <a:rPr lang="en-US" b="1" dirty="0" smtClean="0"/>
+              <a:t>Organizing</a:t>
+            </a:r>
+            <a:r>
               <a:rPr lang="en-US" dirty="0" smtClean="0"/>
-              <a:t>Organizing content (information architecture)</a:t>
+              <a:t> content (information architecture)</a:t>
             </a:r>
           </a:p>
           <a:p>
             <a:pPr lvl="1"/>
             <a:r>
+              <a:rPr lang="en-US" b="1" dirty="0" smtClean="0"/>
+              <a:t>Structuring</a:t>
+            </a:r>
+            <a:r>
               <a:rPr lang="en-US" dirty="0" smtClean="0"/>
-              <a:t>Structuring content (information design)</a:t>
-            </a:r>
-            <a:endParaRPr lang="en-US" dirty="0" smtClean="0"/>
+              <a:t> content (information design)</a:t>
+            </a:r>
           </a:p>
         </p:txBody>
       </p:sp>

</xml_diff>